<commit_message>
Add comments and resize boundary. Close #31. Close #39
</commit_message>
<xml_diff>
--- a/Documents/Presentation-Chimera.pptx
+++ b/Documents/Presentation-Chimera.pptx
@@ -20,21 +20,16 @@
   <p:notesSz cx="6858000" cy="9144000"/>
   <p:embeddedFontLst>
     <p:embeddedFont>
-      <p:font typeface="Press Start 2P" panose="020B0604020202020204" charset="0"/>
+      <p:font typeface="Anaheim" panose="020B0604020202020204" charset="0"/>
       <p:regular r:id="rId10"/>
     </p:embeddedFont>
     <p:embeddedFont>
-      <p:font typeface="Bebas Neue" panose="020B0604020202020204" charset="0"/>
+      <p:font typeface="Bebas Neue" panose="020B0606020202050201" pitchFamily="34" charset="0"/>
       <p:regular r:id="rId11"/>
     </p:embeddedFont>
     <p:embeddedFont>
-      <p:font typeface="Anaheim" panose="020B0604020202020204" charset="0"/>
+      <p:font typeface="Press Start 2P" panose="020B0604020202020204" charset="0"/>
       <p:regular r:id="rId12"/>
-    </p:embeddedFont>
-    <p:embeddedFont>
-      <p:font typeface="Segoe UI Semibold" panose="020B0702040204020203" pitchFamily="34" charset="0"/>
-      <p:bold r:id="rId13"/>
-      <p:boldItalic r:id="rId14"/>
     </p:embeddedFont>
   </p:embeddedFontLst>
   <p:defaultTextStyle>
@@ -1139,19 +1134,8 @@
               <a:latin typeface="Anaheim" panose="020B0604020202020204" charset="0"/>
               <a:cs typeface="Segoe UI Semibold" panose="020B0702040204020203" pitchFamily="34" charset="0"/>
             </a:rPr>
-            <a:t>Developing the </a:t>
+            <a:t>Developing the game</a:t>
           </a:r>
-          <a:r>
-            <a:rPr lang="en-US" dirty="0" smtClean="0">
-              <a:latin typeface="Anaheim" panose="020B0604020202020204" charset="0"/>
-              <a:cs typeface="Segoe UI Semibold" panose="020B0702040204020203" pitchFamily="34" charset="0"/>
-            </a:rPr>
-            <a:t>game</a:t>
-          </a:r>
-          <a:endParaRPr lang="en-US" dirty="0">
-            <a:latin typeface="Anaheim" panose="020B0604020202020204" charset="0"/>
-            <a:cs typeface="Segoe UI Semibold" panose="020B0702040204020203" pitchFamily="34" charset="0"/>
-          </a:endParaRPr>
         </a:p>
       </dgm:t>
     </dgm:pt>
@@ -1224,14 +1208,11 @@
         <a:lstStyle/>
         <a:p>
           <a:r>
-            <a:rPr lang="en-US" dirty="0" smtClean="0">
+            <a:rPr lang="en-US" dirty="0">
               <a:latin typeface="Anaheim" panose="020B0604020202020204" charset="0"/>
             </a:rPr>
             <a:t>Developing the website</a:t>
           </a:r>
-          <a:endParaRPr lang="en-US" dirty="0">
-            <a:latin typeface="Anaheim" panose="020B0604020202020204" charset="0"/>
-          </a:endParaRPr>
         </a:p>
       </dgm:t>
     </dgm:pt>
@@ -1273,35 +1254,14 @@
         </dgm:presLayoutVars>
       </dgm:prSet>
       <dgm:spPr/>
-      <dgm:t>
-        <a:bodyPr/>
-        <a:lstStyle/>
-        <a:p>
-          <a:endParaRPr lang="en-US"/>
-        </a:p>
-      </dgm:t>
     </dgm:pt>
     <dgm:pt modelId="{9BB7F8F1-28C3-4997-B9E0-EBC65BF435CD}" type="pres">
       <dgm:prSet presAssocID="{D539491A-9F4B-4F93-A5C1-1EB25521F430}" presName="sibTrans" presStyleLbl="sibTrans2D1" presStyleIdx="0" presStyleCnt="3"/>
       <dgm:spPr/>
-      <dgm:t>
-        <a:bodyPr/>
-        <a:lstStyle/>
-        <a:p>
-          <a:endParaRPr lang="en-US"/>
-        </a:p>
-      </dgm:t>
     </dgm:pt>
     <dgm:pt modelId="{6DD9C747-07E3-4D8B-A625-D99595E78910}" type="pres">
       <dgm:prSet presAssocID="{D539491A-9F4B-4F93-A5C1-1EB25521F430}" presName="connectorText" presStyleLbl="sibTrans2D1" presStyleIdx="0" presStyleCnt="3"/>
       <dgm:spPr/>
-      <dgm:t>
-        <a:bodyPr/>
-        <a:lstStyle/>
-        <a:p>
-          <a:endParaRPr lang="en-US"/>
-        </a:p>
-      </dgm:t>
     </dgm:pt>
     <dgm:pt modelId="{57095178-9E9D-48D9-8B94-969D73CB6C8D}" type="pres">
       <dgm:prSet presAssocID="{3F331533-821B-4A16-8B44-C83AFFE53030}" presName="node" presStyleLbl="node1" presStyleIdx="1" presStyleCnt="4">
@@ -1326,35 +1286,14 @@
         </dgm:presLayoutVars>
       </dgm:prSet>
       <dgm:spPr/>
-      <dgm:t>
-        <a:bodyPr/>
-        <a:lstStyle/>
-        <a:p>
-          <a:endParaRPr lang="en-US"/>
-        </a:p>
-      </dgm:t>
     </dgm:pt>
     <dgm:pt modelId="{BD8BFFE1-19D4-4FFE-BD87-AFCDF261A1CC}" type="pres">
       <dgm:prSet presAssocID="{FFCDB913-34E2-48BD-8E92-388B7A0F813A}" presName="sibTrans" presStyleLbl="sibTrans2D1" presStyleIdx="2" presStyleCnt="3"/>
       <dgm:spPr/>
-      <dgm:t>
-        <a:bodyPr/>
-        <a:lstStyle/>
-        <a:p>
-          <a:endParaRPr lang="en-US"/>
-        </a:p>
-      </dgm:t>
     </dgm:pt>
     <dgm:pt modelId="{0E466973-37B3-427E-922C-5BA9C1F82095}" type="pres">
       <dgm:prSet presAssocID="{FFCDB913-34E2-48BD-8E92-388B7A0F813A}" presName="connectorText" presStyleLbl="sibTrans2D1" presStyleIdx="2" presStyleCnt="3"/>
       <dgm:spPr/>
-      <dgm:t>
-        <a:bodyPr/>
-        <a:lstStyle/>
-        <a:p>
-          <a:endParaRPr lang="en-US"/>
-        </a:p>
-      </dgm:t>
     </dgm:pt>
     <dgm:pt modelId="{C7F74BB2-5939-4271-91A6-EA5EF6A30544}" type="pres">
       <dgm:prSet presAssocID="{291E26B1-7076-46F8-9F60-7E4771A5B5B1}" presName="node" presStyleLbl="node1" presStyleIdx="3" presStyleCnt="4">
@@ -1363,31 +1302,24 @@
         </dgm:presLayoutVars>
       </dgm:prSet>
       <dgm:spPr/>
-      <dgm:t>
-        <a:bodyPr/>
-        <a:lstStyle/>
-        <a:p>
-          <a:endParaRPr lang="en-US"/>
-        </a:p>
-      </dgm:t>
     </dgm:pt>
   </dgm:ptLst>
   <dgm:cxnLst>
+    <dgm:cxn modelId="{86C66C05-4FAA-4175-AA46-E36C6DED1E26}" type="presOf" srcId="{134CBAF3-9A2D-45FF-84ED-6AD81D5C6AB7}" destId="{E9F77C7D-180E-44BB-9D47-364CF0B3A878}" srcOrd="0" destOrd="0" presId="urn:microsoft.com/office/officeart/2005/8/layout/process1"/>
     <dgm:cxn modelId="{5D83C813-61A9-4C10-9FDB-7E1010846A54}" type="presOf" srcId="{D539491A-9F4B-4F93-A5C1-1EB25521F430}" destId="{6DD9C747-07E3-4D8B-A625-D99595E78910}" srcOrd="1" destOrd="0" presId="urn:microsoft.com/office/officeart/2005/8/layout/process1"/>
     <dgm:cxn modelId="{BE40EB1B-940E-4228-9FC8-16F1AF2F8054}" type="presOf" srcId="{D539491A-9F4B-4F93-A5C1-1EB25521F430}" destId="{9BB7F8F1-28C3-4997-B9E0-EBC65BF435CD}" srcOrd="0" destOrd="0" presId="urn:microsoft.com/office/officeart/2005/8/layout/process1"/>
-    <dgm:cxn modelId="{4BC37AFA-1878-464D-9C98-90097A7C228F}" type="presOf" srcId="{CAE6A7E9-FDD8-4FC7-B8FA-C1395EE11726}" destId="{42FC2038-1065-4153-BAF2-7F7FC3734564}" srcOrd="0" destOrd="0" presId="urn:microsoft.com/office/officeart/2005/8/layout/process1"/>
     <dgm:cxn modelId="{74007E50-6A18-4AAC-99E0-FEE410AE8C14}" srcId="{906408F6-77CD-4D42-B5AC-9D141FDC42EB}" destId="{D797F99D-91D5-4204-8B0C-A704116E1C00}" srcOrd="0" destOrd="0" parTransId="{63756746-CEF5-4854-BC32-87C89C7F3F67}" sibTransId="{D539491A-9F4B-4F93-A5C1-1EB25521F430}"/>
+    <dgm:cxn modelId="{30B38F73-B6DC-409D-B51B-FFDEFA20171C}" srcId="{906408F6-77CD-4D42-B5AC-9D141FDC42EB}" destId="{134CBAF3-9A2D-45FF-84ED-6AD81D5C6AB7}" srcOrd="2" destOrd="0" parTransId="{6E3EE50C-ED34-4D16-B97C-FBF14EF48744}" sibTransId="{FFCDB913-34E2-48BD-8E92-388B7A0F813A}"/>
+    <dgm:cxn modelId="{BF3FE253-4314-43DF-8A86-26350530FCD8}" type="presOf" srcId="{D797F99D-91D5-4204-8B0C-A704116E1C00}" destId="{58503E62-93B2-4CA6-A9F2-428CBA1F0857}" srcOrd="0" destOrd="0" presId="urn:microsoft.com/office/officeart/2005/8/layout/process1"/>
+    <dgm:cxn modelId="{CE236E83-E049-4696-84E0-85C381A91D6C}" type="presOf" srcId="{906408F6-77CD-4D42-B5AC-9D141FDC42EB}" destId="{9A920CF9-9E67-4D0A-9CF5-0EF055DDC6E1}" srcOrd="0" destOrd="0" presId="urn:microsoft.com/office/officeart/2005/8/layout/process1"/>
+    <dgm:cxn modelId="{0C11D7B5-8FC6-45BF-9F02-A365A908872F}" type="presOf" srcId="{FFCDB913-34E2-48BD-8E92-388B7A0F813A}" destId="{0E466973-37B3-427E-922C-5BA9C1F82095}" srcOrd="1" destOrd="0" presId="urn:microsoft.com/office/officeart/2005/8/layout/process1"/>
+    <dgm:cxn modelId="{841B60B8-8E5E-47B6-AEC3-504199D92B6C}" srcId="{906408F6-77CD-4D42-B5AC-9D141FDC42EB}" destId="{291E26B1-7076-46F8-9F60-7E4771A5B5B1}" srcOrd="3" destOrd="0" parTransId="{41B73FF1-AB82-42F6-8930-70FC02244CE3}" sibTransId="{76A3F18B-A818-4965-8E0C-E0CD158ABFB4}"/>
     <dgm:cxn modelId="{DC64F3BB-FFBA-474F-BB87-07075D2BF65F}" type="presOf" srcId="{FFCDB913-34E2-48BD-8E92-388B7A0F813A}" destId="{BD8BFFE1-19D4-4FFE-BD87-AFCDF261A1CC}" srcOrd="0" destOrd="0" presId="urn:microsoft.com/office/officeart/2005/8/layout/process1"/>
-    <dgm:cxn modelId="{0C11D7B5-8FC6-45BF-9F02-A365A908872F}" type="presOf" srcId="{FFCDB913-34E2-48BD-8E92-388B7A0F813A}" destId="{0E466973-37B3-427E-922C-5BA9C1F82095}" srcOrd="1" destOrd="0" presId="urn:microsoft.com/office/officeart/2005/8/layout/process1"/>
-    <dgm:cxn modelId="{86C66C05-4FAA-4175-AA46-E36C6DED1E26}" type="presOf" srcId="{134CBAF3-9A2D-45FF-84ED-6AD81D5C6AB7}" destId="{E9F77C7D-180E-44BB-9D47-364CF0B3A878}" srcOrd="0" destOrd="0" presId="urn:microsoft.com/office/officeart/2005/8/layout/process1"/>
     <dgm:cxn modelId="{5EA610BC-B5E0-4507-A37D-F92AB397047A}" type="presOf" srcId="{3F331533-821B-4A16-8B44-C83AFFE53030}" destId="{57095178-9E9D-48D9-8B94-969D73CB6C8D}" srcOrd="0" destOrd="0" presId="urn:microsoft.com/office/officeart/2005/8/layout/process1"/>
+    <dgm:cxn modelId="{6C500AD2-39D7-4927-9A01-E9D2C760E4DD}" type="presOf" srcId="{291E26B1-7076-46F8-9F60-7E4771A5B5B1}" destId="{C7F74BB2-5939-4271-91A6-EA5EF6A30544}" srcOrd="0" destOrd="0" presId="urn:microsoft.com/office/officeart/2005/8/layout/process1"/>
     <dgm:cxn modelId="{22F8DFE4-0689-45A6-8681-4D539F69F3FD}" type="presOf" srcId="{CAE6A7E9-FDD8-4FC7-B8FA-C1395EE11726}" destId="{825A3D08-2887-4F6B-803C-40B7DD3E9937}" srcOrd="1" destOrd="0" presId="urn:microsoft.com/office/officeart/2005/8/layout/process1"/>
     <dgm:cxn modelId="{5B1125F8-9D23-46BC-8A60-83C3337DFF02}" srcId="{906408F6-77CD-4D42-B5AC-9D141FDC42EB}" destId="{3F331533-821B-4A16-8B44-C83AFFE53030}" srcOrd="1" destOrd="0" parTransId="{42A60BF7-101D-49DB-AEEB-A5C71898EAF9}" sibTransId="{CAE6A7E9-FDD8-4FC7-B8FA-C1395EE11726}"/>
-    <dgm:cxn modelId="{30B38F73-B6DC-409D-B51B-FFDEFA20171C}" srcId="{906408F6-77CD-4D42-B5AC-9D141FDC42EB}" destId="{134CBAF3-9A2D-45FF-84ED-6AD81D5C6AB7}" srcOrd="2" destOrd="0" parTransId="{6E3EE50C-ED34-4D16-B97C-FBF14EF48744}" sibTransId="{FFCDB913-34E2-48BD-8E92-388B7A0F813A}"/>
-    <dgm:cxn modelId="{BF3FE253-4314-43DF-8A86-26350530FCD8}" type="presOf" srcId="{D797F99D-91D5-4204-8B0C-A704116E1C00}" destId="{58503E62-93B2-4CA6-A9F2-428CBA1F0857}" srcOrd="0" destOrd="0" presId="urn:microsoft.com/office/officeart/2005/8/layout/process1"/>
-    <dgm:cxn modelId="{841B60B8-8E5E-47B6-AEC3-504199D92B6C}" srcId="{906408F6-77CD-4D42-B5AC-9D141FDC42EB}" destId="{291E26B1-7076-46F8-9F60-7E4771A5B5B1}" srcOrd="3" destOrd="0" parTransId="{41B73FF1-AB82-42F6-8930-70FC02244CE3}" sibTransId="{76A3F18B-A818-4965-8E0C-E0CD158ABFB4}"/>
-    <dgm:cxn modelId="{6C500AD2-39D7-4927-9A01-E9D2C760E4DD}" type="presOf" srcId="{291E26B1-7076-46F8-9F60-7E4771A5B5B1}" destId="{C7F74BB2-5939-4271-91A6-EA5EF6A30544}" srcOrd="0" destOrd="0" presId="urn:microsoft.com/office/officeart/2005/8/layout/process1"/>
-    <dgm:cxn modelId="{CE236E83-E049-4696-84E0-85C381A91D6C}" type="presOf" srcId="{906408F6-77CD-4D42-B5AC-9D141FDC42EB}" destId="{9A920CF9-9E67-4D0A-9CF5-0EF055DDC6E1}" srcOrd="0" destOrd="0" presId="urn:microsoft.com/office/officeart/2005/8/layout/process1"/>
+    <dgm:cxn modelId="{4BC37AFA-1878-464D-9C98-90097A7C228F}" type="presOf" srcId="{CAE6A7E9-FDD8-4FC7-B8FA-C1395EE11726}" destId="{42FC2038-1065-4153-BAF2-7F7FC3734564}" srcOrd="0" destOrd="0" presId="urn:microsoft.com/office/officeart/2005/8/layout/process1"/>
     <dgm:cxn modelId="{DC81B1B2-8B6A-4102-BD8D-1BE36B9F2D56}" type="presParOf" srcId="{9A920CF9-9E67-4D0A-9CF5-0EF055DDC6E1}" destId="{58503E62-93B2-4CA6-A9F2-428CBA1F0857}" srcOrd="0" destOrd="0" presId="urn:microsoft.com/office/officeart/2005/8/layout/process1"/>
     <dgm:cxn modelId="{2FA68E94-983C-4E83-8A52-CB95823ABB3F}" type="presParOf" srcId="{9A920CF9-9E67-4D0A-9CF5-0EF055DDC6E1}" destId="{9BB7F8F1-28C3-4997-B9E0-EBC65BF435CD}" srcOrd="1" destOrd="0" presId="urn:microsoft.com/office/officeart/2005/8/layout/process1"/>
     <dgm:cxn modelId="{0E77E726-4BAD-4CAA-82B8-C2A137C7A449}" type="presParOf" srcId="{9BB7F8F1-28C3-4997-B9E0-EBC65BF435CD}" destId="{6DD9C747-07E3-4D8B-A625-D99595E78910}" srcOrd="0" destOrd="0" presId="urn:microsoft.com/office/officeart/2005/8/layout/process1"/>
@@ -1480,7 +1412,7 @@
         </a:bodyPr>
         <a:lstStyle/>
         <a:p>
-          <a:pPr lvl="0" algn="ctr" defTabSz="1022350">
+          <a:pPr marL="0" lvl="0" indent="0" algn="ctr" defTabSz="1022350">
             <a:lnSpc>
               <a:spcPct val="90000"/>
             </a:lnSpc>
@@ -1490,6 +1422,7 @@
             <a:spcAft>
               <a:spcPct val="35000"/>
             </a:spcAft>
+            <a:buNone/>
           </a:pPr>
           <a:r>
             <a:rPr lang="en-US" sz="2300" kern="1200" dirty="0">
@@ -1561,7 +1494,7 @@
         </a:bodyPr>
         <a:lstStyle/>
         <a:p>
-          <a:pPr lvl="0" algn="ctr" defTabSz="800100">
+          <a:pPr marL="0" lvl="0" indent="0" algn="ctr" defTabSz="800100">
             <a:lnSpc>
               <a:spcPct val="90000"/>
             </a:lnSpc>
@@ -1571,6 +1504,7 @@
             <a:spcAft>
               <a:spcPct val="35000"/>
             </a:spcAft>
+            <a:buNone/>
           </a:pPr>
           <a:endParaRPr lang="en-US" sz="1800" kern="1200"/>
         </a:p>
@@ -1643,7 +1577,7 @@
         </a:bodyPr>
         <a:lstStyle/>
         <a:p>
-          <a:pPr lvl="0" algn="ctr" defTabSz="1022350">
+          <a:pPr marL="0" lvl="0" indent="0" algn="ctr" defTabSz="1022350">
             <a:lnSpc>
               <a:spcPct val="90000"/>
             </a:lnSpc>
@@ -1653,16 +1587,14 @@
             <a:spcAft>
               <a:spcPct val="35000"/>
             </a:spcAft>
+            <a:buNone/>
           </a:pPr>
           <a:r>
-            <a:rPr lang="en-US" sz="2300" kern="1200" dirty="0" smtClean="0">
+            <a:rPr lang="en-US" sz="2300" kern="1200" dirty="0">
               <a:latin typeface="Anaheim" panose="020B0604020202020204" charset="0"/>
             </a:rPr>
             <a:t>Developing the website</a:t>
           </a:r>
-          <a:endParaRPr lang="en-US" sz="2300" kern="1200" dirty="0">
-            <a:latin typeface="Anaheim" panose="020B0604020202020204" charset="0"/>
-          </a:endParaRPr>
         </a:p>
       </dsp:txBody>
       <dsp:txXfrm>
@@ -1726,7 +1658,7 @@
         </a:bodyPr>
         <a:lstStyle/>
         <a:p>
-          <a:pPr lvl="0" algn="ctr" defTabSz="800100">
+          <a:pPr marL="0" lvl="0" indent="0" algn="ctr" defTabSz="800100">
             <a:lnSpc>
               <a:spcPct val="90000"/>
             </a:lnSpc>
@@ -1736,6 +1668,7 @@
             <a:spcAft>
               <a:spcPct val="35000"/>
             </a:spcAft>
+            <a:buNone/>
           </a:pPr>
           <a:endParaRPr lang="en-US" sz="1800" kern="1200"/>
         </a:p>
@@ -1808,7 +1741,7 @@
         </a:bodyPr>
         <a:lstStyle/>
         <a:p>
-          <a:pPr lvl="0" algn="ctr" defTabSz="1022350">
+          <a:pPr marL="0" lvl="0" indent="0" algn="ctr" defTabSz="1022350">
             <a:lnSpc>
               <a:spcPct val="90000"/>
             </a:lnSpc>
@@ -1818,25 +1751,15 @@
             <a:spcAft>
               <a:spcPct val="35000"/>
             </a:spcAft>
+            <a:buNone/>
           </a:pPr>
           <a:r>
             <a:rPr lang="en-US" sz="2300" kern="1200" dirty="0">
               <a:latin typeface="Anaheim" panose="020B0604020202020204" charset="0"/>
               <a:cs typeface="Segoe UI Semibold" panose="020B0702040204020203" pitchFamily="34" charset="0"/>
             </a:rPr>
-            <a:t>Developing the </a:t>
+            <a:t>Developing the game</a:t>
           </a:r>
-          <a:r>
-            <a:rPr lang="en-US" sz="2300" kern="1200" dirty="0" smtClean="0">
-              <a:latin typeface="Anaheim" panose="020B0604020202020204" charset="0"/>
-              <a:cs typeface="Segoe UI Semibold" panose="020B0702040204020203" pitchFamily="34" charset="0"/>
-            </a:rPr>
-            <a:t>game</a:t>
-          </a:r>
-          <a:endParaRPr lang="en-US" sz="2300" kern="1200" dirty="0">
-            <a:latin typeface="Anaheim" panose="020B0604020202020204" charset="0"/>
-            <a:cs typeface="Segoe UI Semibold" panose="020B0702040204020203" pitchFamily="34" charset="0"/>
-          </a:endParaRPr>
         </a:p>
       </dsp:txBody>
       <dsp:txXfrm>
@@ -1900,7 +1823,7 @@
         </a:bodyPr>
         <a:lstStyle/>
         <a:p>
-          <a:pPr lvl="0" algn="ctr" defTabSz="800100">
+          <a:pPr marL="0" lvl="0" indent="0" algn="ctr" defTabSz="800100">
             <a:lnSpc>
               <a:spcPct val="90000"/>
             </a:lnSpc>
@@ -1910,6 +1833,7 @@
             <a:spcAft>
               <a:spcPct val="35000"/>
             </a:spcAft>
+            <a:buNone/>
           </a:pPr>
           <a:endParaRPr lang="en-US" sz="1800" kern="1200"/>
         </a:p>
@@ -1982,7 +1906,7 @@
         </a:bodyPr>
         <a:lstStyle/>
         <a:p>
-          <a:pPr lvl="0" algn="ctr" defTabSz="1022350">
+          <a:pPr marL="0" lvl="0" indent="0" algn="ctr" defTabSz="1022350">
             <a:lnSpc>
               <a:spcPct val="90000"/>
             </a:lnSpc>
@@ -1992,6 +1916,7 @@
             <a:spcAft>
               <a:spcPct val="35000"/>
             </a:spcAft>
+            <a:buNone/>
           </a:pPr>
           <a:r>
             <a:rPr lang="en-US" sz="2300" kern="1200" dirty="0">
@@ -8945,7 +8870,7 @@
       </a:lvl9pPr>
     </p:otherStyle>
   </p:txStyles>
-  <p:extLst mod="1">
+  <p:extLst>
     <p:ext uri="{27BBF7A9-308A-43DC-89C8-2F10F3537804}">
       <p15:sldGuideLst xmlns:p15="http://schemas.microsoft.com/office/powerpoint/2012/main">
         <p15:guide id="1" orient="horz" pos="340">
@@ -9036,7 +8961,7 @@
               <a:buNone/>
             </a:pPr>
             <a:r>
-              <a:rPr lang="en" b="1" dirty="0" smtClean="0">
+              <a:rPr lang="en" b="1" dirty="0">
                 <a:solidFill>
                   <a:srgbClr val="1F5A4A"/>
                 </a:solidFill>
@@ -9086,13 +9011,6 @@
   <p:clrMapOvr>
     <a:masterClrMapping/>
   </p:clrMapOvr>
-  <p:timing>
-    <p:tnLst>
-      <p:par>
-        <p:cTn id="1" dur="indefinite" restart="never" nodeType="tmRoot"/>
-      </p:par>
-    </p:tnLst>
-  </p:timing>
 </p:sld>
 </file>
 
@@ -9181,32 +9099,17 @@
             <a:p>
               <a:pPr algn="ctr"/>
               <a:r>
-                <a:rPr lang="en-GB" sz="1600" b="1" dirty="0" err="1" smtClean="0">
+                <a:rPr lang="en-GB" sz="1600" b="1" dirty="0" err="1">
                   <a:latin typeface="Anaheim" panose="020B0604020202020204" charset="0"/>
                 </a:rPr>
-                <a:t>Galq</a:t>
+                <a:t>Galya</a:t>
               </a:r>
               <a:r>
-                <a:rPr lang="en-GB" sz="1600" b="1" dirty="0" smtClean="0">
+                <a:rPr lang="en-GB" sz="1600" b="1" dirty="0">
                   <a:latin typeface="Anaheim" panose="020B0604020202020204" charset="0"/>
                 </a:rPr>
-                <a:t> </a:t>
+                <a:t> Ivanova: Backend Developer</a:t>
               </a:r>
-              <a:r>
-                <a:rPr lang="en-GB" sz="1600" b="1" dirty="0" err="1" smtClean="0">
-                  <a:latin typeface="Anaheim" panose="020B0604020202020204" charset="0"/>
-                </a:rPr>
-                <a:t>Ivanova</a:t>
-              </a:r>
-              <a:r>
-                <a:rPr lang="en-GB" sz="1600" b="1" dirty="0" smtClean="0">
-                  <a:latin typeface="Anaheim" panose="020B0604020202020204" charset="0"/>
-                </a:rPr>
-                <a:t>: Backend Developer</a:t>
-              </a:r>
-              <a:endParaRPr lang="en-GB" sz="1600" b="1" dirty="0">
-                <a:latin typeface="Anaheim" panose="020B0604020202020204" charset="0"/>
-              </a:endParaRPr>
             </a:p>
           </p:txBody>
         </p:sp>
@@ -9279,25 +9182,25 @@
             <a:p>
               <a:pPr algn="ctr"/>
               <a:r>
-                <a:rPr lang="en-GB" sz="1600" b="1" dirty="0" err="1" smtClean="0">
+                <a:rPr lang="en-GB" sz="1600" b="1" dirty="0" err="1">
                   <a:latin typeface="Anaheim" panose="020B0604020202020204" charset="0"/>
                 </a:rPr>
                 <a:t>Yoan</a:t>
               </a:r>
               <a:r>
-                <a:rPr lang="en-GB" sz="1600" b="1" dirty="0" smtClean="0">
+                <a:rPr lang="en-GB" sz="1600" b="1" dirty="0">
                   <a:latin typeface="Anaheim" panose="020B0604020202020204" charset="0"/>
                 </a:rPr>
                 <a:t> </a:t>
               </a:r>
               <a:r>
-                <a:rPr lang="en-GB" sz="1600" b="1" dirty="0" err="1" smtClean="0">
+                <a:rPr lang="en-GB" sz="1600" b="1" dirty="0" err="1">
                   <a:latin typeface="Anaheim" panose="020B0604020202020204" charset="0"/>
                 </a:rPr>
                 <a:t>Gavrilov</a:t>
               </a:r>
               <a:r>
-                <a:rPr lang="en-GB" sz="1600" b="1" dirty="0" smtClean="0">
+                <a:rPr lang="en-GB" sz="1600" b="1" dirty="0">
                   <a:latin typeface="Anaheim" panose="020B0604020202020204" charset="0"/>
                 </a:rPr>
                 <a:t>:</a:t>
@@ -9306,14 +9209,11 @@
             <a:p>
               <a:pPr algn="ctr"/>
               <a:r>
-                <a:rPr lang="en-GB" sz="1600" b="1" dirty="0" smtClean="0">
+                <a:rPr lang="en-GB" sz="1600" b="1" dirty="0">
                   <a:latin typeface="Anaheim" panose="020B0604020202020204" charset="0"/>
                 </a:rPr>
                 <a:t>QA Engineer</a:t>
               </a:r>
-              <a:endParaRPr lang="en-GB" sz="1600" b="1" dirty="0">
-                <a:latin typeface="Anaheim" panose="020B0604020202020204" charset="0"/>
-              </a:endParaRPr>
             </a:p>
           </p:txBody>
         </p:sp>
@@ -9386,19 +9286,19 @@
             <a:p>
               <a:pPr algn="ctr"/>
               <a:r>
-                <a:rPr lang="en-GB" sz="1600" b="1" dirty="0" err="1" smtClean="0">
+                <a:rPr lang="en-GB" sz="1600" b="1" dirty="0" err="1">
                   <a:latin typeface="Anaheim" panose="020B0604020202020204" charset="0"/>
                 </a:rPr>
                 <a:t>Hristo</a:t>
               </a:r>
               <a:r>
-                <a:rPr lang="en-GB" sz="1600" b="1" dirty="0" smtClean="0">
+                <a:rPr lang="en-GB" sz="1600" b="1" dirty="0">
                   <a:latin typeface="Anaheim" panose="020B0604020202020204" charset="0"/>
                 </a:rPr>
                 <a:t> </a:t>
               </a:r>
               <a:r>
-                <a:rPr lang="en-GB" sz="1600" b="1" dirty="0" err="1" smtClean="0">
+                <a:rPr lang="en-GB" sz="1600" b="1" dirty="0" err="1">
                   <a:latin typeface="Anaheim" panose="020B0604020202020204" charset="0"/>
                 </a:rPr>
                 <a:t>Kovachev</a:t>
@@ -9407,17 +9307,8 @@
                 <a:rPr lang="en-GB" sz="1600" b="1" dirty="0">
                   <a:latin typeface="Anaheim" panose="020B0604020202020204" charset="0"/>
                 </a:rPr>
-                <a:t>:</a:t>
+                <a:t>: Scrum Trainer</a:t>
               </a:r>
-              <a:r>
-                <a:rPr lang="en-GB" sz="1600" b="1" dirty="0" smtClean="0">
-                  <a:latin typeface="Anaheim" panose="020B0604020202020204" charset="0"/>
-                </a:rPr>
-                <a:t> Scrum Trainer</a:t>
-              </a:r>
-              <a:endParaRPr lang="en-GB" sz="1600" b="1" dirty="0">
-                <a:latin typeface="Anaheim" panose="020B0604020202020204" charset="0"/>
-              </a:endParaRPr>
             </a:p>
           </p:txBody>
         </p:sp>
@@ -9490,26 +9381,23 @@
             <a:p>
               <a:pPr algn="ctr"/>
               <a:r>
-                <a:rPr lang="en-GB" sz="1600" b="1" dirty="0" smtClean="0">
+                <a:rPr lang="en-GB" sz="1600" b="1" dirty="0">
                   <a:latin typeface="Anaheim" panose="020B0604020202020204" charset="0"/>
                 </a:rPr>
                 <a:t>Konstantin </a:t>
               </a:r>
               <a:r>
-                <a:rPr lang="en-GB" sz="1600" b="1" dirty="0" err="1" smtClean="0">
+                <a:rPr lang="en-GB" sz="1600" b="1" dirty="0" err="1">
                   <a:latin typeface="Anaheim" panose="020B0604020202020204" charset="0"/>
                 </a:rPr>
                 <a:t>Dinev</a:t>
               </a:r>
               <a:r>
-                <a:rPr lang="en-GB" sz="1600" b="1" dirty="0" smtClean="0">
+                <a:rPr lang="en-GB" sz="1600" b="1" dirty="0">
                   <a:latin typeface="Anaheim" panose="020B0604020202020204" charset="0"/>
                 </a:rPr>
                 <a:t>: Backend Developer</a:t>
               </a:r>
-              <a:endParaRPr lang="en-GB" sz="1600" b="1" dirty="0">
-                <a:latin typeface="Anaheim" panose="020B0604020202020204" charset="0"/>
-              </a:endParaRPr>
             </a:p>
           </p:txBody>
         </p:sp>
@@ -9582,32 +9470,29 @@
             <a:p>
               <a:pPr algn="ctr"/>
               <a:r>
-                <a:rPr lang="en-GB" sz="1600" b="1" dirty="0" err="1" smtClean="0">
+                <a:rPr lang="en-GB" sz="1600" b="1" dirty="0" err="1">
                   <a:latin typeface="Anaheim" panose="020B0604020202020204" charset="0"/>
                 </a:rPr>
                 <a:t>Hristiyan</a:t>
               </a:r>
               <a:r>
-                <a:rPr lang="en-GB" sz="1600" b="1" dirty="0" smtClean="0">
+                <a:rPr lang="en-GB" sz="1600" b="1" dirty="0">
                   <a:latin typeface="Anaheim" panose="020B0604020202020204" charset="0"/>
                 </a:rPr>
                 <a:t> </a:t>
               </a:r>
               <a:r>
-                <a:rPr lang="en-GB" sz="1600" b="1" dirty="0" err="1" smtClean="0">
+                <a:rPr lang="en-GB" sz="1600" b="1" dirty="0" err="1">
                   <a:latin typeface="Anaheim" panose="020B0604020202020204" charset="0"/>
                 </a:rPr>
                 <a:t>Petrov</a:t>
               </a:r>
               <a:r>
-                <a:rPr lang="en-GB" sz="1600" b="1" dirty="0" smtClean="0">
+                <a:rPr lang="en-GB" sz="1600" b="1" dirty="0">
                   <a:latin typeface="Anaheim" panose="020B0604020202020204" charset="0"/>
                 </a:rPr>
                 <a:t>: Backend Developer</a:t>
               </a:r>
-              <a:endParaRPr lang="en-GB" sz="1600" b="1" dirty="0">
-                <a:latin typeface="Anaheim" panose="020B0604020202020204" charset="0"/>
-              </a:endParaRPr>
             </a:p>
           </p:txBody>
         </p:sp>
@@ -9680,43 +9565,34 @@
             <a:p>
               <a:pPr algn="ctr"/>
               <a:r>
-                <a:rPr lang="en-GB" sz="1600" b="1" dirty="0" err="1" smtClean="0">
+                <a:rPr lang="en-GB" sz="1600" b="1" dirty="0">
                   <a:latin typeface="Anaheim" panose="020B0604020202020204" charset="0"/>
                 </a:rPr>
-                <a:t>Valeriq</a:t>
+                <a:t>Valeria </a:t>
               </a:r>
               <a:r>
-                <a:rPr lang="en-GB" sz="1600" b="1" dirty="0" smtClean="0">
-                  <a:latin typeface="Anaheim" panose="020B0604020202020204" charset="0"/>
-                </a:rPr>
-                <a:t> </a:t>
-              </a:r>
-              <a:r>
-                <a:rPr lang="en-GB" sz="1600" b="1" dirty="0" err="1" smtClean="0">
+                <a:rPr lang="en-GB" sz="1600" b="1" dirty="0" err="1">
                   <a:latin typeface="Anaheim" panose="020B0604020202020204" charset="0"/>
                 </a:rPr>
                 <a:t>Chavdarova</a:t>
               </a:r>
               <a:r>
-                <a:rPr lang="en-GB" sz="1600" b="1" dirty="0" smtClean="0">
+                <a:rPr lang="en-GB" sz="1600" b="1" dirty="0">
                   <a:latin typeface="Anaheim" panose="020B0604020202020204" charset="0"/>
                 </a:rPr>
                 <a:t>:</a:t>
               </a:r>
               <a:br>
-                <a:rPr lang="en-GB" sz="1600" b="1" dirty="0" smtClean="0">
+                <a:rPr lang="en-GB" sz="1600" b="1" dirty="0">
                   <a:latin typeface="Anaheim" panose="020B0604020202020204" charset="0"/>
                 </a:rPr>
               </a:br>
               <a:r>
-                <a:rPr lang="en-GB" sz="1600" b="1" dirty="0" smtClean="0">
+                <a:rPr lang="en-GB" sz="1600" b="1" dirty="0">
                   <a:latin typeface="Anaheim" panose="020B0604020202020204" charset="0"/>
                 </a:rPr>
                 <a:t>Frontend Developer</a:t>
               </a:r>
-              <a:endParaRPr lang="en-GB" sz="1600" b="1" dirty="0">
-                <a:latin typeface="Anaheim" panose="020B0604020202020204" charset="0"/>
-              </a:endParaRPr>
             </a:p>
           </p:txBody>
         </p:sp>
@@ -9789,32 +9665,29 @@
             <a:p>
               <a:pPr algn="ctr"/>
               <a:r>
-                <a:rPr lang="en-GB" sz="1600" b="1" dirty="0" err="1" smtClean="0">
+                <a:rPr lang="en-GB" sz="1600" b="1" dirty="0" err="1">
                   <a:latin typeface="Anaheim" panose="020B0604020202020204" charset="0"/>
                 </a:rPr>
                 <a:t>Teodora</a:t>
               </a:r>
               <a:r>
-                <a:rPr lang="en-GB" sz="1600" b="1" dirty="0" smtClean="0">
+                <a:rPr lang="en-GB" sz="1600" b="1" dirty="0">
                   <a:latin typeface="Anaheim" panose="020B0604020202020204" charset="0"/>
                 </a:rPr>
                 <a:t> </a:t>
               </a:r>
               <a:r>
-                <a:rPr lang="en-GB" sz="1600" b="1" dirty="0" err="1" smtClean="0">
+                <a:rPr lang="en-GB" sz="1600" b="1" dirty="0" err="1">
                   <a:latin typeface="Anaheim" panose="020B0604020202020204" charset="0"/>
                 </a:rPr>
                 <a:t>Lozeva</a:t>
               </a:r>
               <a:r>
-                <a:rPr lang="en-GB" sz="1600" b="1" dirty="0" smtClean="0">
+                <a:rPr lang="en-GB" sz="1600" b="1" dirty="0">
                   <a:latin typeface="Anaheim" panose="020B0604020202020204" charset="0"/>
                 </a:rPr>
                 <a:t>: Frontend Developer</a:t>
               </a:r>
-              <a:endParaRPr lang="en-GB" sz="1600" b="1" dirty="0">
-                <a:latin typeface="Anaheim" panose="020B0604020202020204" charset="0"/>
-              </a:endParaRPr>
             </a:p>
           </p:txBody>
         </p:sp>
@@ -9829,13 +9702,6 @@
   <p:clrMapOvr>
     <a:masterClrMapping/>
   </p:clrMapOvr>
-  <p:timing>
-    <p:tnLst>
-      <p:par>
-        <p:cTn id="1" dur="indefinite" restart="never" nodeType="tmRoot"/>
-      </p:par>
-    </p:tnLst>
-  </p:timing>
 </p:sld>
 </file>
 
@@ -10109,7 +9975,7 @@
           <a:p>
             <a:pPr algn="ctr"/>
             <a:r>
-              <a:rPr lang="en" sz="4800" b="1" dirty="0" smtClean="0">
+              <a:rPr lang="en" sz="4800" b="1" dirty="0">
                 <a:solidFill>
                   <a:srgbClr val="1F5A4A"/>
                 </a:solidFill>
@@ -10233,13 +10099,6 @@
   <p:clrMapOvr>
     <a:masterClrMapping/>
   </p:clrMapOvr>
-  <p:timing>
-    <p:tnLst>
-      <p:par>
-        <p:cTn id="1" dur="indefinite" restart="never" nodeType="tmRoot"/>
-      </p:par>
-    </p:tnLst>
-  </p:timing>
 </p:sld>
 </file>
 
@@ -10513,7 +10372,7 @@
           <a:p>
             <a:pPr algn="ctr"/>
             <a:r>
-              <a:rPr lang="en" sz="4800" b="1" dirty="0" smtClean="0">
+              <a:rPr lang="en" sz="4800" b="1" dirty="0">
                 <a:solidFill>
                   <a:srgbClr val="1F5A4A"/>
                 </a:solidFill>
@@ -10562,13 +10421,6 @@
   <p:clrMapOvr>
     <a:masterClrMapping/>
   </p:clrMapOvr>
-  <p:timing>
-    <p:tnLst>
-      <p:par>
-        <p:cTn id="1" dur="indefinite" restart="never" nodeType="tmRoot"/>
-      </p:par>
-    </p:tnLst>
-  </p:timing>
 </p:sld>
 </file>
 
@@ -10842,7 +10694,7 @@
           <a:p>
             <a:pPr algn="ctr"/>
             <a:r>
-              <a:rPr lang="en" sz="3600" b="1" dirty="0" smtClean="0">
+              <a:rPr lang="en" sz="3600" b="1" dirty="0">
                 <a:solidFill>
                   <a:srgbClr val="1F5A4A"/>
                 </a:solidFill>
@@ -10877,7 +10729,7 @@
           <a:blip r:embed="rId2">
             <a:extLst>
               <a:ext uri="{837473B0-CC2E-450A-ABE3-18F120FF3D39}">
-                <a1611:picAttrSrcUrl xmlns="" xmlns:a1611="http://schemas.microsoft.com/office/drawing/2016/11/main" r:id="rId16"/>
+                <a1611:picAttrSrcUrl xmlns:a1611="http://schemas.microsoft.com/office/drawing/2016/11/main" r:id="rId3"/>
               </a:ext>
             </a:extLst>
           </a:blip>
@@ -10904,7 +10756,7 @@
           <p:nvPr/>
         </p:nvPicPr>
         <p:blipFill>
-          <a:blip r:embed="rId17">
+          <a:blip r:embed="rId4">
             <a:extLst>
               <a:ext uri="{28A0092B-C50C-407E-A947-70E740481C1C}">
                 <a14:useLocalDpi xmlns:a14="http://schemas.microsoft.com/office/drawing/2010/main" val="0"/>
@@ -10951,10 +10803,10 @@
           <p:nvPr/>
         </p:nvPicPr>
         <p:blipFill>
-          <a:blip r:embed="rId18">
+          <a:blip r:embed="rId5">
             <a:extLst>
               <a:ext uri="{837473B0-CC2E-450A-ABE3-18F120FF3D39}">
-                <a1611:picAttrSrcUrl xmlns="" xmlns:a1611="http://schemas.microsoft.com/office/drawing/2016/11/main" r:id="rId14"/>
+                <a1611:picAttrSrcUrl xmlns:a1611="http://schemas.microsoft.com/office/drawing/2016/11/main" r:id="rId6"/>
               </a:ext>
             </a:extLst>
           </a:blip>
@@ -10981,11 +10833,11 @@
           <p:nvPr/>
         </p:nvPicPr>
         <p:blipFill rotWithShape="1">
-          <a:blip r:embed="rId19">
+          <a:blip r:embed="rId7">
             <a:extLst>
               <a:ext uri="{BEBA8EAE-BF5A-486C-A8C5-ECC9F3942E4B}">
                 <a14:imgProps xmlns:a14="http://schemas.microsoft.com/office/drawing/2010/main">
-                  <a14:imgLayer r:embed="rId20">
+                  <a14:imgLayer r:embed="rId8">
                     <a14:imgEffect>
                       <a14:backgroundRemoval t="9947" b="100000" l="0" r="100000"/>
                     </a14:imgEffect>
@@ -11029,11 +10881,11 @@
           <p:nvPr/>
         </p:nvPicPr>
         <p:blipFill rotWithShape="1">
-          <a:blip r:embed="rId21">
+          <a:blip r:embed="rId9">
             <a:extLst>
               <a:ext uri="{BEBA8EAE-BF5A-486C-A8C5-ECC9F3942E4B}">
                 <a14:imgProps xmlns:a14="http://schemas.microsoft.com/office/drawing/2010/main">
-                  <a14:imgLayer r:embed="rId22">
+                  <a14:imgLayer r:embed="rId10">
                     <a14:imgEffect>
                       <a14:backgroundRemoval t="10000" b="100000" l="10000" r="90000"/>
                     </a14:imgEffect>
@@ -11077,7 +10929,7 @@
           <p:nvPr/>
         </p:nvPicPr>
         <p:blipFill rotWithShape="1">
-          <a:blip r:embed="rId23"/>
+          <a:blip r:embed="rId11"/>
           <a:srcRect l="9120" t="17142" r="9119" b="9793"/>
           <a:stretch/>
         </p:blipFill>
@@ -11100,7 +10952,7 @@
           <p:nvPr/>
         </p:nvPicPr>
         <p:blipFill rotWithShape="1">
-          <a:blip r:embed="rId24"/>
+          <a:blip r:embed="rId12"/>
           <a:srcRect l="15820" r="19572"/>
           <a:stretch/>
         </p:blipFill>
@@ -11123,7 +10975,7 @@
           <p:nvPr/>
         </p:nvPicPr>
         <p:blipFill>
-          <a:blip r:embed="rId25"/>
+          <a:blip r:embed="rId13"/>
           <a:stretch>
             <a:fillRect/>
           </a:stretch>
@@ -11147,7 +10999,7 @@
           <p:nvPr/>
         </p:nvPicPr>
         <p:blipFill rotWithShape="1">
-          <a:blip r:embed="rId26"/>
+          <a:blip r:embed="rId14"/>
           <a:srcRect t="8575" r="10282" b="5698"/>
           <a:stretch/>
         </p:blipFill>
@@ -11170,7 +11022,7 @@
           <p:nvPr/>
         </p:nvPicPr>
         <p:blipFill>
-          <a:blip r:embed="rId27">
+          <a:blip r:embed="rId15">
             <a:extLst>
               <a:ext uri="{28A0092B-C50C-407E-A947-70E740481C1C}">
                 <a14:useLocalDpi xmlns:a14="http://schemas.microsoft.com/office/drawing/2010/main" val="0"/>
@@ -11200,7 +11052,7 @@
           <p:nvPr/>
         </p:nvPicPr>
         <p:blipFill>
-          <a:blip r:embed="rId28"/>
+          <a:blip r:embed="rId16"/>
           <a:stretch>
             <a:fillRect/>
           </a:stretch>
@@ -11224,7 +11076,7 @@
           <p:nvPr/>
         </p:nvPicPr>
         <p:blipFill>
-          <a:blip r:embed="rId29"/>
+          <a:blip r:embed="rId17"/>
           <a:stretch>
             <a:fillRect/>
           </a:stretch>
@@ -11248,7 +11100,7 @@
           <p:nvPr/>
         </p:nvPicPr>
         <p:blipFill>
-          <a:blip r:embed="rId30"/>
+          <a:blip r:embed="rId18"/>
           <a:stretch>
             <a:fillRect/>
           </a:stretch>
@@ -11273,13 +11125,6 @@
   <p:clrMapOvr>
     <a:masterClrMapping/>
   </p:clrMapOvr>
-  <p:timing>
-    <p:tnLst>
-      <p:par>
-        <p:cTn id="1" dur="indefinite" restart="never" nodeType="tmRoot"/>
-      </p:par>
-    </p:tnLst>
-  </p:timing>
 </p:sld>
 </file>
 
@@ -11553,7 +11398,7 @@
           <a:p>
             <a:pPr algn="ctr"/>
             <a:r>
-              <a:rPr lang="en" sz="4400" b="1" dirty="0" smtClean="0">
+              <a:rPr lang="en" sz="4400" b="1" dirty="0">
                 <a:solidFill>
                   <a:srgbClr val="1F5A4A"/>
                 </a:solidFill>
@@ -11580,13 +11425,6 @@
   <p:clrMapOvr>
     <a:masterClrMapping/>
   </p:clrMapOvr>
-  <p:timing>
-    <p:tnLst>
-      <p:par>
-        <p:cTn id="1" dur="indefinite" restart="never" nodeType="tmRoot"/>
-      </p:par>
-    </p:tnLst>
-  </p:timing>
 </p:sld>
 </file>
 
@@ -11860,7 +11698,7 @@
           <a:p>
             <a:pPr algn="ctr"/>
             <a:r>
-              <a:rPr lang="en" sz="4800" b="1" dirty="0" smtClean="0">
+              <a:rPr lang="en" sz="4800" b="1" dirty="0">
                 <a:solidFill>
                   <a:srgbClr val="1F5A4A"/>
                 </a:solidFill>
@@ -11887,13 +11725,6 @@
   <p:clrMapOvr>
     <a:masterClrMapping/>
   </p:clrMapOvr>
-  <p:timing>
-    <p:tnLst>
-      <p:par>
-        <p:cTn id="1" dur="indefinite" restart="never" nodeType="tmRoot"/>
-      </p:par>
-    </p:tnLst>
-  </p:timing>
 </p:sld>
 </file>
 

</xml_diff>